<commit_message>
Add guide for bicep and IAM
</commit_message>
<xml_diff>
--- a/assets/Architecture.pptx
+++ b/assets/Architecture.pptx
@@ -104,6 +104,11 @@
       </a:defRPr>
     </a:lvl9pPr>
   </p:defaultTextStyle>
+  <p:extLst>
+    <p:ext uri="{EFAFB233-063F-42B5-8137-9DF3F51BA10A}">
+      <p15:sldGuideLst xmlns:p15="http://schemas.microsoft.com/office/powerpoint/2012/main"/>
+    </p:ext>
+  </p:extLst>
 </p:presentation>
 </file>
 
@@ -562,7 +567,7 @@
           <a:p>
             <a:fld id="{F0CB0818-5DF7-A940-86F4-FFB7C80D4BAA}" type="datetimeFigureOut">
               <a:rPr kumimoji="1" lang="ja-JP" altLang="en-US" smtClean="0"/>
-              <a:t>2026/1/13</a:t>
+              <a:t>2026/2/9</a:t>
             </a:fld>
             <a:endParaRPr kumimoji="1" lang="ja-JP" altLang="en-US"/>
           </a:p>
@@ -792,7 +797,7 @@
           <a:p>
             <a:fld id="{F0CB0818-5DF7-A940-86F4-FFB7C80D4BAA}" type="datetimeFigureOut">
               <a:rPr kumimoji="1" lang="ja-JP" altLang="en-US" smtClean="0"/>
-              <a:t>2026/1/13</a:t>
+              <a:t>2026/2/9</a:t>
             </a:fld>
             <a:endParaRPr kumimoji="1" lang="ja-JP" altLang="en-US"/>
           </a:p>
@@ -1032,7 +1037,7 @@
           <a:p>
             <a:fld id="{F0CB0818-5DF7-A940-86F4-FFB7C80D4BAA}" type="datetimeFigureOut">
               <a:rPr kumimoji="1" lang="ja-JP" altLang="en-US" smtClean="0"/>
-              <a:t>2026/1/13</a:t>
+              <a:t>2026/2/9</a:t>
             </a:fld>
             <a:endParaRPr kumimoji="1" lang="ja-JP" altLang="en-US"/>
           </a:p>
@@ -1262,7 +1267,7 @@
           <a:p>
             <a:fld id="{F0CB0818-5DF7-A940-86F4-FFB7C80D4BAA}" type="datetimeFigureOut">
               <a:rPr kumimoji="1" lang="ja-JP" altLang="en-US" smtClean="0"/>
-              <a:t>2026/1/13</a:t>
+              <a:t>2026/2/9</a:t>
             </a:fld>
             <a:endParaRPr kumimoji="1" lang="ja-JP" altLang="en-US"/>
           </a:p>
@@ -1537,7 +1542,7 @@
           <a:p>
             <a:fld id="{F0CB0818-5DF7-A940-86F4-FFB7C80D4BAA}" type="datetimeFigureOut">
               <a:rPr kumimoji="1" lang="ja-JP" altLang="en-US" smtClean="0"/>
-              <a:t>2026/1/13</a:t>
+              <a:t>2026/2/9</a:t>
             </a:fld>
             <a:endParaRPr kumimoji="1" lang="ja-JP" altLang="en-US"/>
           </a:p>
@@ -1866,7 +1871,7 @@
           <a:p>
             <a:fld id="{F0CB0818-5DF7-A940-86F4-FFB7C80D4BAA}" type="datetimeFigureOut">
               <a:rPr kumimoji="1" lang="ja-JP" altLang="en-US" smtClean="0"/>
-              <a:t>2026/1/13</a:t>
+              <a:t>2026/2/9</a:t>
             </a:fld>
             <a:endParaRPr kumimoji="1" lang="ja-JP" altLang="en-US"/>
           </a:p>
@@ -2342,7 +2347,7 @@
           <a:p>
             <a:fld id="{F0CB0818-5DF7-A940-86F4-FFB7C80D4BAA}" type="datetimeFigureOut">
               <a:rPr kumimoji="1" lang="ja-JP" altLang="en-US" smtClean="0"/>
-              <a:t>2026/1/13</a:t>
+              <a:t>2026/2/9</a:t>
             </a:fld>
             <a:endParaRPr kumimoji="1" lang="ja-JP" altLang="en-US"/>
           </a:p>
@@ -2483,7 +2488,7 @@
           <a:p>
             <a:fld id="{F0CB0818-5DF7-A940-86F4-FFB7C80D4BAA}" type="datetimeFigureOut">
               <a:rPr kumimoji="1" lang="ja-JP" altLang="en-US" smtClean="0"/>
-              <a:t>2026/1/13</a:t>
+              <a:t>2026/2/9</a:t>
             </a:fld>
             <a:endParaRPr kumimoji="1" lang="ja-JP" altLang="en-US"/>
           </a:p>
@@ -2596,7 +2601,7 @@
           <a:p>
             <a:fld id="{F0CB0818-5DF7-A940-86F4-FFB7C80D4BAA}" type="datetimeFigureOut">
               <a:rPr kumimoji="1" lang="ja-JP" altLang="en-US" smtClean="0"/>
-              <a:t>2026/1/13</a:t>
+              <a:t>2026/2/9</a:t>
             </a:fld>
             <a:endParaRPr kumimoji="1" lang="ja-JP" altLang="en-US"/>
           </a:p>
@@ -2939,7 +2944,7 @@
           <a:p>
             <a:fld id="{F0CB0818-5DF7-A940-86F4-FFB7C80D4BAA}" type="datetimeFigureOut">
               <a:rPr kumimoji="1" lang="ja-JP" altLang="en-US" smtClean="0"/>
-              <a:t>2026/1/13</a:t>
+              <a:t>2026/2/9</a:t>
             </a:fld>
             <a:endParaRPr kumimoji="1" lang="ja-JP" altLang="en-US"/>
           </a:p>
@@ -3227,7 +3232,7 @@
           <a:p>
             <a:fld id="{F0CB0818-5DF7-A940-86F4-FFB7C80D4BAA}" type="datetimeFigureOut">
               <a:rPr kumimoji="1" lang="ja-JP" altLang="en-US" smtClean="0"/>
-              <a:t>2026/1/13</a:t>
+              <a:t>2026/2/9</a:t>
             </a:fld>
             <a:endParaRPr kumimoji="1" lang="ja-JP" altLang="en-US"/>
           </a:p>
@@ -3500,7 +3505,7 @@
           <a:p>
             <a:fld id="{F0CB0818-5DF7-A940-86F4-FFB7C80D4BAA}" type="datetimeFigureOut">
               <a:rPr kumimoji="1" lang="ja-JP" altLang="en-US" smtClean="0"/>
-              <a:t>2026/1/13</a:t>
+              <a:t>2026/2/9</a:t>
             </a:fld>
             <a:endParaRPr kumimoji="1" lang="ja-JP" altLang="en-US"/>
           </a:p>
@@ -6708,8 +6713,8 @@
           </a:p>
         </p:txBody>
       </p:sp>
-      <mc:AlternateContent xmlns:mc="http://schemas.openxmlformats.org/markup-compatibility/2006">
-        <mc:Choice xmlns:p14="http://schemas.microsoft.com/office/powerpoint/2010/main" Requires="p14">
+      <mc:AlternateContent xmlns:mc="http://schemas.openxmlformats.org/markup-compatibility/2006" xmlns:p14="http://schemas.microsoft.com/office/powerpoint/2010/main">
+        <mc:Choice Requires="p14">
           <p:contentPart p14:bwMode="auto" r:id="rId28">
             <p14:nvContentPartPr>
               <p14:cNvPr id="79" name="インク 78">
@@ -6728,7 +6733,7 @@
             </p14:xfrm>
           </p:contentPart>
         </mc:Choice>
-        <mc:Fallback>
+        <mc:Fallback xmlns="">
           <p:pic>
             <p:nvPicPr>
               <p:cNvPr id="79" name="インク 78">
@@ -6759,8 +6764,8 @@
           </p:pic>
         </mc:Fallback>
       </mc:AlternateContent>
-      <mc:AlternateContent xmlns:mc="http://schemas.openxmlformats.org/markup-compatibility/2006">
-        <mc:Choice xmlns:p14="http://schemas.microsoft.com/office/powerpoint/2010/main" Requires="p14">
+      <mc:AlternateContent xmlns:mc="http://schemas.openxmlformats.org/markup-compatibility/2006" xmlns:p14="http://schemas.microsoft.com/office/powerpoint/2010/main">
+        <mc:Choice Requires="p14">
           <p:contentPart p14:bwMode="auto" r:id="rId30">
             <p14:nvContentPartPr>
               <p14:cNvPr id="80" name="インク 79">
@@ -6779,7 +6784,7 @@
             </p14:xfrm>
           </p:contentPart>
         </mc:Choice>
-        <mc:Fallback>
+        <mc:Fallback xmlns="">
           <p:pic>
             <p:nvPicPr>
               <p:cNvPr id="80" name="インク 79">
@@ -7109,8 +7114,8 @@
             <a:chExt cx="309240" cy="1763640"/>
           </a:xfrm>
         </p:grpSpPr>
-        <mc:AlternateContent xmlns:mc="http://schemas.openxmlformats.org/markup-compatibility/2006">
-          <mc:Choice xmlns:p14="http://schemas.microsoft.com/office/powerpoint/2010/main" Requires="p14">
+        <mc:AlternateContent xmlns:mc="http://schemas.openxmlformats.org/markup-compatibility/2006" xmlns:p14="http://schemas.microsoft.com/office/powerpoint/2010/main">
+          <mc:Choice Requires="p14">
             <p:contentPart p14:bwMode="auto" r:id="rId34">
               <p14:nvContentPartPr>
                 <p14:cNvPr id="87" name="インク 86">
@@ -7129,7 +7134,7 @@
               </p14:xfrm>
             </p:contentPart>
           </mc:Choice>
-          <mc:Fallback>
+          <mc:Fallback xmlns="">
             <p:pic>
               <p:nvPicPr>
                 <p:cNvPr id="87" name="インク 86">
@@ -7160,8 +7165,8 @@
             </p:pic>
           </mc:Fallback>
         </mc:AlternateContent>
-        <mc:AlternateContent xmlns:mc="http://schemas.openxmlformats.org/markup-compatibility/2006">
-          <mc:Choice xmlns:p14="http://schemas.microsoft.com/office/powerpoint/2010/main" Requires="p14">
+        <mc:AlternateContent xmlns:mc="http://schemas.openxmlformats.org/markup-compatibility/2006" xmlns:p14="http://schemas.microsoft.com/office/powerpoint/2010/main">
+          <mc:Choice Requires="p14">
             <p:contentPart p14:bwMode="auto" r:id="rId36">
               <p14:nvContentPartPr>
                 <p14:cNvPr id="88" name="インク 87">
@@ -7180,7 +7185,7 @@
               </p14:xfrm>
             </p:contentPart>
           </mc:Choice>
-          <mc:Fallback>
+          <mc:Fallback xmlns="">
             <p:pic>
               <p:nvPicPr>
                 <p:cNvPr id="88" name="インク 87">
@@ -7260,8 +7265,8 @@
           </a:p>
         </p:txBody>
       </p:sp>
-      <mc:AlternateContent xmlns:mc="http://schemas.openxmlformats.org/markup-compatibility/2006">
-        <mc:Choice xmlns:p14="http://schemas.microsoft.com/office/powerpoint/2010/main" Requires="p14">
+      <mc:AlternateContent xmlns:mc="http://schemas.openxmlformats.org/markup-compatibility/2006" xmlns:p14="http://schemas.microsoft.com/office/powerpoint/2010/main">
+        <mc:Choice Requires="p14">
           <p:contentPart p14:bwMode="auto" r:id="rId38">
             <p14:nvContentPartPr>
               <p14:cNvPr id="92" name="インク 91">
@@ -7280,7 +7285,7 @@
             </p14:xfrm>
           </p:contentPart>
         </mc:Choice>
-        <mc:Fallback>
+        <mc:Fallback xmlns="">
           <p:pic>
             <p:nvPicPr>
               <p:cNvPr id="92" name="インク 91">
@@ -7331,8 +7336,8 @@
             <a:chExt cx="1302120" cy="3066480"/>
           </a:xfrm>
         </p:grpSpPr>
-        <mc:AlternateContent xmlns:mc="http://schemas.openxmlformats.org/markup-compatibility/2006">
-          <mc:Choice xmlns:p14="http://schemas.microsoft.com/office/powerpoint/2010/main" Requires="p14">
+        <mc:AlternateContent xmlns:mc="http://schemas.openxmlformats.org/markup-compatibility/2006" xmlns:p14="http://schemas.microsoft.com/office/powerpoint/2010/main">
+          <mc:Choice Requires="p14">
             <p:contentPart p14:bwMode="auto" r:id="rId40">
               <p14:nvContentPartPr>
                 <p14:cNvPr id="93" name="インク 92">
@@ -7351,7 +7356,7 @@
               </p14:xfrm>
             </p:contentPart>
           </mc:Choice>
-          <mc:Fallback>
+          <mc:Fallback xmlns="">
             <p:pic>
               <p:nvPicPr>
                 <p:cNvPr id="93" name="インク 92">
@@ -7382,8 +7387,8 @@
             </p:pic>
           </mc:Fallback>
         </mc:AlternateContent>
-        <mc:AlternateContent xmlns:mc="http://schemas.openxmlformats.org/markup-compatibility/2006">
-          <mc:Choice xmlns:p14="http://schemas.microsoft.com/office/powerpoint/2010/main" Requires="p14">
+        <mc:AlternateContent xmlns:mc="http://schemas.openxmlformats.org/markup-compatibility/2006" xmlns:p14="http://schemas.microsoft.com/office/powerpoint/2010/main">
+          <mc:Choice Requires="p14">
             <p:contentPart p14:bwMode="auto" r:id="rId42">
               <p14:nvContentPartPr>
                 <p14:cNvPr id="96" name="インク 95">
@@ -7402,7 +7407,7 @@
               </p14:xfrm>
             </p:contentPart>
           </mc:Choice>
-          <mc:Fallback>
+          <mc:Fallback xmlns="">
             <p:pic>
               <p:nvPicPr>
                 <p:cNvPr id="96" name="インク 95">
@@ -7433,8 +7438,8 @@
             </p:pic>
           </mc:Fallback>
         </mc:AlternateContent>
-        <mc:AlternateContent xmlns:mc="http://schemas.openxmlformats.org/markup-compatibility/2006">
-          <mc:Choice xmlns:p14="http://schemas.microsoft.com/office/powerpoint/2010/main" Requires="p14">
+        <mc:AlternateContent xmlns:mc="http://schemas.openxmlformats.org/markup-compatibility/2006" xmlns:p14="http://schemas.microsoft.com/office/powerpoint/2010/main">
+          <mc:Choice Requires="p14">
             <p:contentPart p14:bwMode="auto" r:id="rId44">
               <p14:nvContentPartPr>
                 <p14:cNvPr id="99" name="インク 98">
@@ -7453,7 +7458,7 @@
               </p14:xfrm>
             </p:contentPart>
           </mc:Choice>
-          <mc:Fallback>
+          <mc:Fallback xmlns="">
             <p:pic>
               <p:nvPicPr>
                 <p:cNvPr id="99" name="インク 98">
@@ -7484,8 +7489,8 @@
             </p:pic>
           </mc:Fallback>
         </mc:AlternateContent>
-        <mc:AlternateContent xmlns:mc="http://schemas.openxmlformats.org/markup-compatibility/2006">
-          <mc:Choice xmlns:p14="http://schemas.microsoft.com/office/powerpoint/2010/main" Requires="p14">
+        <mc:AlternateContent xmlns:mc="http://schemas.openxmlformats.org/markup-compatibility/2006" xmlns:p14="http://schemas.microsoft.com/office/powerpoint/2010/main">
+          <mc:Choice Requires="p14">
             <p:contentPart p14:bwMode="auto" r:id="rId46">
               <p14:nvContentPartPr>
                 <p14:cNvPr id="105" name="インク 104">
@@ -7504,7 +7509,7 @@
               </p14:xfrm>
             </p:contentPart>
           </mc:Choice>
-          <mc:Fallback>
+          <mc:Fallback xmlns="">
             <p:pic>
               <p:nvPicPr>
                 <p:cNvPr id="105" name="インク 104">
@@ -7535,8 +7540,8 @@
             </p:pic>
           </mc:Fallback>
         </mc:AlternateContent>
-        <mc:AlternateContent xmlns:mc="http://schemas.openxmlformats.org/markup-compatibility/2006">
-          <mc:Choice xmlns:p14="http://schemas.microsoft.com/office/powerpoint/2010/main" Requires="p14">
+        <mc:AlternateContent xmlns:mc="http://schemas.openxmlformats.org/markup-compatibility/2006" xmlns:p14="http://schemas.microsoft.com/office/powerpoint/2010/main">
+          <mc:Choice Requires="p14">
             <p:contentPart p14:bwMode="auto" r:id="rId48">
               <p14:nvContentPartPr>
                 <p14:cNvPr id="106" name="インク 105">
@@ -7555,7 +7560,7 @@
               </p14:xfrm>
             </p:contentPart>
           </mc:Choice>
-          <mc:Fallback>
+          <mc:Fallback xmlns="">
             <p:pic>
               <p:nvPicPr>
                 <p:cNvPr id="106" name="インク 105">
@@ -7586,8 +7591,8 @@
             </p:pic>
           </mc:Fallback>
         </mc:AlternateContent>
-        <mc:AlternateContent xmlns:mc="http://schemas.openxmlformats.org/markup-compatibility/2006">
-          <mc:Choice xmlns:p14="http://schemas.microsoft.com/office/powerpoint/2010/main" Requires="p14">
+        <mc:AlternateContent xmlns:mc="http://schemas.openxmlformats.org/markup-compatibility/2006" xmlns:p14="http://schemas.microsoft.com/office/powerpoint/2010/main">
+          <mc:Choice Requires="p14">
             <p:contentPart p14:bwMode="auto" r:id="rId50">
               <p14:nvContentPartPr>
                 <p14:cNvPr id="109" name="インク 108">
@@ -7606,7 +7611,7 @@
               </p14:xfrm>
             </p:contentPart>
           </mc:Choice>
-          <mc:Fallback>
+          <mc:Fallback xmlns="">
             <p:pic>
               <p:nvPicPr>
                 <p:cNvPr id="109" name="インク 108">
@@ -8016,6 +8021,7 @@
 
 <file path=docMetadata/LabelInfo.xml><?xml version="1.0" encoding="utf-8"?>
 <clbl:labelList xmlns:clbl="http://schemas.microsoft.com/office/2020/mipLabelMetadata">
+  <clbl:label id="{defa4170-0d19-0005-0001-bc88714345d2}" enabled="1" method="Privileged" siteId="{a65eb34c-2a57-48cb-b63f-cc2561b88dd4}" contentBits="0" removed="0"/>
   <clbl:label id="{f42aa342-8706-4288-bd11-ebb85995028c}" enabled="1" method="Standard" siteId="{72f988bf-86f1-41af-91ab-2d7cd011db47}" contentBits="0" removed="0"/>
 </clbl:labelList>
 </file>
</xml_diff>